<commit_message>
Update Valley Metro-Group Project 1-Team 1 NEW.pptx
</commit_message>
<xml_diff>
--- a/Valley Metro-Group Project 1-Team 1 NEW.pptx
+++ b/Valley Metro-Group Project 1-Team 1 NEW.pptx
@@ -8220,71 +8220,6 @@
           </a:p>
         </p:txBody>
       </p:sp>
-      <p:sp>
-        <p:nvSpPr>
-          <p:cNvPr id="2" name="TextBox 1">
-            <a:extLst>
-              <a:ext uri="{FF2B5EF4-FFF2-40B4-BE49-F238E27FC236}">
-                <a16:creationId xmlns:a16="http://schemas.microsoft.com/office/drawing/2014/main" id="{7F49D9F1-B152-46CE-B640-FC6A1F7B592B}"/>
-              </a:ext>
-            </a:extLst>
-          </p:cNvPr>
-          <p:cNvSpPr txBox="1"/>
-          <p:nvPr/>
-        </p:nvSpPr>
-        <p:spPr>
-          <a:xfrm>
-            <a:off x="10143460" y="2030819"/>
-            <a:ext cx="1733107" cy="1754326"/>
-          </a:xfrm>
-          <a:prstGeom prst="rect">
-            <a:avLst/>
-          </a:prstGeom>
-          <a:noFill/>
-        </p:spPr>
-        <p:txBody>
-          <a:bodyPr wrap="square" rtlCol="0">
-            <a:spAutoFit/>
-          </a:bodyPr>
-          <a:lstStyle/>
-          <a:p>
-            <a:r>
-              <a:rPr lang="en-US" dirty="0"/>
-              <a:t>% Ridership vs Population</a:t>
-            </a:r>
-          </a:p>
-          <a:p>
-            <a:endParaRPr lang="en-US" dirty="0"/>
-          </a:p>
-          <a:p>
-            <a:pPr marL="285750" indent="-285750">
-              <a:buFont typeface="Wingdings" panose="05000000000000000000" pitchFamily="2" charset="2"/>
-              <a:buChar char="q"/>
-            </a:pPr>
-            <a:r>
-              <a:rPr lang="en-US" dirty="0"/>
-              <a:t>2017 : 34%</a:t>
-            </a:r>
-          </a:p>
-          <a:p>
-            <a:pPr marL="285750" indent="-285750">
-              <a:buFont typeface="Wingdings" panose="05000000000000000000" pitchFamily="2" charset="2"/>
-              <a:buChar char="q"/>
-            </a:pPr>
-            <a:endParaRPr lang="en-US" dirty="0"/>
-          </a:p>
-          <a:p>
-            <a:pPr marL="285750" indent="-285750">
-              <a:buFont typeface="Wingdings" panose="05000000000000000000" pitchFamily="2" charset="2"/>
-              <a:buChar char="q"/>
-            </a:pPr>
-            <a:r>
-              <a:rPr lang="en-US" dirty="0"/>
-              <a:t>2018 : 44%</a:t>
-            </a:r>
-          </a:p>
-        </p:txBody>
-      </p:sp>
     </p:spTree>
     <p:extLst>
       <p:ext uri="{BB962C8B-B14F-4D97-AF65-F5344CB8AC3E}">
@@ -8389,71 +8324,6 @@
           </a:p>
         </p:txBody>
       </p:sp>
-      <p:sp>
-        <p:nvSpPr>
-          <p:cNvPr id="4" name="TextBox 3">
-            <a:extLst>
-              <a:ext uri="{FF2B5EF4-FFF2-40B4-BE49-F238E27FC236}">
-                <a16:creationId xmlns:a16="http://schemas.microsoft.com/office/drawing/2014/main" id="{AEF7446C-DE36-4F93-9C43-E69A6FE23A93}"/>
-              </a:ext>
-            </a:extLst>
-          </p:cNvPr>
-          <p:cNvSpPr txBox="1"/>
-          <p:nvPr/>
-        </p:nvSpPr>
-        <p:spPr>
-          <a:xfrm>
-            <a:off x="9962706" y="2052811"/>
-            <a:ext cx="1733107" cy="1754326"/>
-          </a:xfrm>
-          <a:prstGeom prst="rect">
-            <a:avLst/>
-          </a:prstGeom>
-          <a:noFill/>
-        </p:spPr>
-        <p:txBody>
-          <a:bodyPr wrap="square" rtlCol="0">
-            <a:spAutoFit/>
-          </a:bodyPr>
-          <a:lstStyle/>
-          <a:p>
-            <a:r>
-              <a:rPr lang="en-US" dirty="0"/>
-              <a:t>% Ridership vs Population</a:t>
-            </a:r>
-          </a:p>
-          <a:p>
-            <a:endParaRPr lang="en-US" dirty="0"/>
-          </a:p>
-          <a:p>
-            <a:pPr marL="285750" indent="-285750">
-              <a:buFont typeface="Wingdings" panose="05000000000000000000" pitchFamily="2" charset="2"/>
-              <a:buChar char="q"/>
-            </a:pPr>
-            <a:r>
-              <a:rPr lang="en-US" dirty="0"/>
-              <a:t>2017 : 33%</a:t>
-            </a:r>
-          </a:p>
-          <a:p>
-            <a:pPr marL="285750" indent="-285750">
-              <a:buFont typeface="Wingdings" panose="05000000000000000000" pitchFamily="2" charset="2"/>
-              <a:buChar char="q"/>
-            </a:pPr>
-            <a:endParaRPr lang="en-US" dirty="0"/>
-          </a:p>
-          <a:p>
-            <a:pPr marL="285750" indent="-285750">
-              <a:buFont typeface="Wingdings" panose="05000000000000000000" pitchFamily="2" charset="2"/>
-              <a:buChar char="q"/>
-            </a:pPr>
-            <a:r>
-              <a:rPr lang="en-US" dirty="0"/>
-              <a:t>2018 : 38%</a:t>
-            </a:r>
-          </a:p>
-        </p:txBody>
-      </p:sp>
     </p:spTree>
     <p:extLst>
       <p:ext uri="{BB962C8B-B14F-4D97-AF65-F5344CB8AC3E}">
@@ -8554,71 +8424,6 @@
                 <a:latin typeface="Arial Narrow" panose="020B0606020202030204" pitchFamily="34" charset="0"/>
               </a:rPr>
               <a:t>Mesa Jurisdiction Bus Ridership with Population Growth</a:t>
-            </a:r>
-          </a:p>
-        </p:txBody>
-      </p:sp>
-      <p:sp>
-        <p:nvSpPr>
-          <p:cNvPr id="2" name="TextBox 1">
-            <a:extLst>
-              <a:ext uri="{FF2B5EF4-FFF2-40B4-BE49-F238E27FC236}">
-                <a16:creationId xmlns:a16="http://schemas.microsoft.com/office/drawing/2014/main" id="{85014A0B-05AA-4983-9484-61A8DE483DCE}"/>
-              </a:ext>
-            </a:extLst>
-          </p:cNvPr>
-          <p:cNvSpPr txBox="1"/>
-          <p:nvPr/>
-        </p:nvSpPr>
-        <p:spPr>
-          <a:xfrm>
-            <a:off x="10058399" y="2022373"/>
-            <a:ext cx="1733107" cy="1754326"/>
-          </a:xfrm>
-          <a:prstGeom prst="rect">
-            <a:avLst/>
-          </a:prstGeom>
-          <a:noFill/>
-        </p:spPr>
-        <p:txBody>
-          <a:bodyPr wrap="square" rtlCol="0">
-            <a:spAutoFit/>
-          </a:bodyPr>
-          <a:lstStyle/>
-          <a:p>
-            <a:r>
-              <a:rPr lang="en-US" dirty="0"/>
-              <a:t>% Ridership vs Population</a:t>
-            </a:r>
-          </a:p>
-          <a:p>
-            <a:endParaRPr lang="en-US" dirty="0"/>
-          </a:p>
-          <a:p>
-            <a:pPr marL="285750" indent="-285750">
-              <a:buFont typeface="Wingdings" panose="05000000000000000000" pitchFamily="2" charset="2"/>
-              <a:buChar char="q"/>
-            </a:pPr>
-            <a:r>
-              <a:rPr lang="en-US" dirty="0"/>
-              <a:t>2017 : 13%</a:t>
-            </a:r>
-          </a:p>
-          <a:p>
-            <a:pPr marL="285750" indent="-285750">
-              <a:buFont typeface="Wingdings" panose="05000000000000000000" pitchFamily="2" charset="2"/>
-              <a:buChar char="q"/>
-            </a:pPr>
-            <a:endParaRPr lang="en-US" dirty="0"/>
-          </a:p>
-          <a:p>
-            <a:pPr marL="285750" indent="-285750">
-              <a:buFont typeface="Wingdings" panose="05000000000000000000" pitchFamily="2" charset="2"/>
-              <a:buChar char="q"/>
-            </a:pPr>
-            <a:r>
-              <a:rPr lang="en-US" dirty="0"/>
-              <a:t>2018 : 15%</a:t>
             </a:r>
           </a:p>
         </p:txBody>

</xml_diff>